<commit_message>
mainviewmodel changes and doc changes
mainviewmodel changes and doc changes
</commit_message>
<xml_diff>
--- a/LBGPOC_Manual_Doc.pptx
+++ b/LBGPOC_Manual_Doc.pptx
@@ -14,8 +14,9 @@
     <p:sldId id="266" r:id="rId8"/>
     <p:sldId id="270" r:id="rId9"/>
     <p:sldId id="271" r:id="rId10"/>
-    <p:sldId id="276" r:id="rId11"/>
-    <p:sldId id="277" r:id="rId12"/>
+    <p:sldId id="278" r:id="rId11"/>
+    <p:sldId id="276" r:id="rId12"/>
+    <p:sldId id="277" r:id="rId13"/>
   </p:sldIdLst>
   <p:sldSz cx="12192000" cy="6858000"/>
   <p:notesSz cx="6858000" cy="9144000"/>
@@ -3131,6 +3132,90 @@
       </p:grpSpPr>
       <p:pic>
         <p:nvPicPr>
+          <p:cNvPr id="10" name="Picture 9"/>
+          <p:cNvPicPr>
+            <a:picLocks noChangeAspect="1"/>
+          </p:cNvPicPr>
+          <p:nvPr/>
+        </p:nvPicPr>
+        <p:blipFill>
+          <a:blip r:embed="rId2">
+            <a:extLst>
+              <a:ext uri="{28A0092B-C50C-407E-A947-70E740481C1C}">
+                <a14:useLocalDpi xmlns:a14="http://schemas.microsoft.com/office/drawing/2010/main" val="0"/>
+              </a:ext>
+            </a:extLst>
+          </a:blip>
+          <a:stretch>
+            <a:fillRect/>
+          </a:stretch>
+        </p:blipFill>
+        <p:spPr>
+          <a:xfrm>
+            <a:off x="263169" y="267945"/>
+            <a:ext cx="2397621" cy="1168840"/>
+          </a:xfrm>
+          <a:prstGeom prst="rect">
+            <a:avLst/>
+          </a:prstGeom>
+        </p:spPr>
+      </p:pic>
+      <p:pic>
+        <p:nvPicPr>
+          <p:cNvPr id="8" name="Picture 7"/>
+          <p:cNvPicPr>
+            <a:picLocks noChangeAspect="1"/>
+          </p:cNvPicPr>
+          <p:nvPr/>
+        </p:nvPicPr>
+        <p:blipFill>
+          <a:blip r:embed="rId3"/>
+          <a:stretch>
+            <a:fillRect/>
+          </a:stretch>
+        </p:blipFill>
+        <p:spPr>
+          <a:xfrm>
+            <a:off x="2843670" y="295377"/>
+            <a:ext cx="9202464" cy="5044028"/>
+          </a:xfrm>
+          <a:prstGeom prst="rect">
+            <a:avLst/>
+          </a:prstGeom>
+        </p:spPr>
+      </p:pic>
+    </p:spTree>
+    <p:extLst>
+      <p:ext uri="{BB962C8B-B14F-4D97-AF65-F5344CB8AC3E}">
+        <p14:creationId xmlns:p14="http://schemas.microsoft.com/office/powerpoint/2010/main" val="2639367031"/>
+      </p:ext>
+    </p:extLst>
+  </p:cSld>
+  <p:clrMapOvr>
+    <a:masterClrMapping/>
+  </p:clrMapOvr>
+</p:sld>
+</file>
+
+<file path=ppt/slides/slide11.xml><?xml version="1.0" encoding="utf-8"?>
+<p:sld xmlns:a="http://schemas.openxmlformats.org/drawingml/2006/main" xmlns:r="http://schemas.openxmlformats.org/officeDocument/2006/relationships" xmlns:p="http://schemas.openxmlformats.org/presentationml/2006/main">
+  <p:cSld>
+    <p:spTree>
+      <p:nvGrpSpPr>
+        <p:cNvPr id="1" name=""/>
+        <p:cNvGrpSpPr/>
+        <p:nvPr/>
+      </p:nvGrpSpPr>
+      <p:grpSpPr>
+        <a:xfrm>
+          <a:off x="0" y="0"/>
+          <a:ext cx="0" cy="0"/>
+          <a:chOff x="0" y="0"/>
+          <a:chExt cx="0" cy="0"/>
+        </a:xfrm>
+      </p:grpSpPr>
+      <p:pic>
+        <p:nvPicPr>
           <p:cNvPr id="4" name="Picture 3"/>
           <p:cNvPicPr>
             <a:picLocks noChangeAspect="1"/>
@@ -3291,7 +3376,7 @@
 </p:sld>
 </file>
 
-<file path=ppt/slides/slide11.xml><?xml version="1.0" encoding="utf-8"?>
+<file path=ppt/slides/slide12.xml><?xml version="1.0" encoding="utf-8"?>
 <p:sld xmlns:a="http://schemas.openxmlformats.org/drawingml/2006/main" xmlns:r="http://schemas.openxmlformats.org/officeDocument/2006/relationships" xmlns:p="http://schemas.openxmlformats.org/presentationml/2006/main">
   <p:cSld>
     <p:spTree>
@@ -4844,7 +4929,7 @@
       </p:sp>
       <p:pic>
         <p:nvPicPr>
-          <p:cNvPr id="3" name="Picture 2"/>
+          <p:cNvPr id="2" name="Picture 1"/>
           <p:cNvPicPr>
             <a:picLocks noChangeAspect="1"/>
           </p:cNvPicPr>
@@ -4864,8 +4949,8 @@
         </p:blipFill>
         <p:spPr>
           <a:xfrm>
-            <a:off x="5200848" y="149469"/>
-            <a:ext cx="3175496" cy="6629400"/>
+            <a:off x="5445404" y="91914"/>
+            <a:ext cx="3165160" cy="6607822"/>
           </a:xfrm>
           <a:prstGeom prst="rect">
             <a:avLst/>

</xml_diff>